<commit_message>
add vidoe for homework1
</commit_message>
<xml_diff>
--- a/CourseMaterial/Presentation/Git/Git和GitHub讲解.pptx
+++ b/CourseMaterial/Presentation/Git/Git和GitHub讲解.pptx
@@ -6370,27 +6370,7 @@
                 <a:latin typeface="微软雅黑" panose="020B0503020204020204" pitchFamily="34" charset="-122"/>
                 <a:ea typeface="微软雅黑" panose="020B0503020204020204" pitchFamily="34" charset="-122"/>
               </a:rPr>
-              <a:t>           </a:t>
-            </a:r>
-            <a:r>
-              <a:rPr lang="en-US" altLang="zh-CN" sz="2000" dirty="0" err="1">
-                <a:solidFill>
-                  <a:srgbClr val="FF0000"/>
-                </a:solidFill>
-                <a:latin typeface="微软雅黑" panose="020B0503020204020204" pitchFamily="34" charset="-122"/>
-                <a:ea typeface="微软雅黑" panose="020B0503020204020204" pitchFamily="34" charset="-122"/>
-              </a:rPr>
-              <a:t>git</a:t>
-            </a:r>
-            <a:r>
-              <a:rPr lang="en-US" altLang="zh-CN" sz="2000" dirty="0">
-                <a:solidFill>
-                  <a:srgbClr val="FF0000"/>
-                </a:solidFill>
-                <a:latin typeface="微软雅黑" panose="020B0503020204020204" pitchFamily="34" charset="-122"/>
-                <a:ea typeface="微软雅黑" panose="020B0503020204020204" pitchFamily="34" charset="-122"/>
-              </a:rPr>
-              <a:t> reset –hard  </a:t>
+              <a:t>           git reset --hard  </a:t>
             </a:r>
             <a:r>
               <a:rPr lang="zh-CN" altLang="en-US" sz="2000" dirty="0">
@@ -6561,6 +6541,16 @@
               <a:t>rsa</a:t>
             </a:r>
             <a:r>
+              <a:rPr lang="en-US" altLang="zh-CN">
+                <a:solidFill>
+                  <a:srgbClr val="FF0000"/>
+                </a:solidFill>
+                <a:latin typeface="微软雅黑" panose="020B0503020204020204" pitchFamily="34" charset="-122"/>
+                <a:ea typeface="微软雅黑" panose="020B0503020204020204" pitchFamily="34" charset="-122"/>
+              </a:rPr>
+              <a:t> –</a:t>
+            </a:r>
+            <a:r>
               <a:rPr lang="en-US" altLang="zh-CN" dirty="0">
                 <a:solidFill>
                   <a:srgbClr val="FF0000"/>
@@ -6568,7 +6558,7 @@
                 <a:latin typeface="微软雅黑" panose="020B0503020204020204" pitchFamily="34" charset="-122"/>
                 <a:ea typeface="微软雅黑" panose="020B0503020204020204" pitchFamily="34" charset="-122"/>
               </a:rPr>
-              <a:t> –C “Your Email”</a:t>
+              <a:t>C “Your Email”</a:t>
             </a:r>
           </a:p>
           <a:p>
@@ -17486,7 +17476,7 @@
                 <a:latin typeface="微软雅黑" panose="020B0503020204020204" pitchFamily="34" charset="-122"/>
                 <a:ea typeface="微软雅黑" panose="020B0503020204020204" pitchFamily="34" charset="-122"/>
               </a:rPr>
-              <a:t>配置对所有用户都普遍适用的配置</a:t>
+              <a:t>配置对当前用户都普遍适用的配置</a:t>
             </a:r>
             <a:endParaRPr lang="en-US" altLang="zh-CN" sz="2000" dirty="0">
               <a:latin typeface="微软雅黑" panose="020B0503020204020204" pitchFamily="34" charset="-122"/>

</xml_diff>